<commit_message>
Update the pptx files
</commit_message>
<xml_diff>
--- a/docs/diagrams/LogicComponentClassDiagram.pptx
+++ b/docs/diagrams/LogicComponentClassDiagram.pptx
@@ -109,7 +109,7 @@
   </p:defaultTextStyle>
   <p:extLst>
     <p:ext uri="{EFAFB233-063F-42B5-8137-9DF3F51BA10A}">
-      <p15:sldGuideLst xmlns:p15="http://schemas.microsoft.com/office/powerpoint/2012/main">
+      <p15:sldGuideLst xmlns:p15="http://schemas.microsoft.com/office/powerpoint/2012/main" xmlns="">
         <p15:guide id="1" orient="horz" pos="1488">
           <p15:clr>
             <a:srgbClr val="A4A3A4"/>
@@ -208,7 +208,7 @@
           <a:p>
             <a:fld id="{F5CC4B3F-88C1-4FFA-B1B6-F41C21DC6924}" type="datetimeFigureOut">
               <a:rPr lang="en-US" smtClean="0"/>
-              <a:t>2/2/2017</a:t>
+              <a:t>3/15/2017</a:t>
             </a:fld>
             <a:endParaRPr lang="en-US"/>
           </a:p>
@@ -657,7 +657,7 @@
           <a:p>
             <a:fld id="{78C97017-6FC3-485B-9764-EAC9E56C1D49}" type="datetimeFigureOut">
               <a:rPr lang="en-US" smtClean="0"/>
-              <a:t>2/2/2017</a:t>
+              <a:t>3/15/2017</a:t>
             </a:fld>
             <a:endParaRPr lang="en-US"/>
           </a:p>
@@ -827,7 +827,7 @@
           <a:p>
             <a:fld id="{78C97017-6FC3-485B-9764-EAC9E56C1D49}" type="datetimeFigureOut">
               <a:rPr lang="en-US" smtClean="0"/>
-              <a:t>2/2/2017</a:t>
+              <a:t>3/15/2017</a:t>
             </a:fld>
             <a:endParaRPr lang="en-US"/>
           </a:p>
@@ -1007,7 +1007,7 @@
           <a:p>
             <a:fld id="{78C97017-6FC3-485B-9764-EAC9E56C1D49}" type="datetimeFigureOut">
               <a:rPr lang="en-US" smtClean="0"/>
-              <a:t>2/2/2017</a:t>
+              <a:t>3/15/2017</a:t>
             </a:fld>
             <a:endParaRPr lang="en-US"/>
           </a:p>
@@ -1177,7 +1177,7 @@
           <a:p>
             <a:fld id="{78C97017-6FC3-485B-9764-EAC9E56C1D49}" type="datetimeFigureOut">
               <a:rPr lang="en-US" smtClean="0"/>
-              <a:t>2/2/2017</a:t>
+              <a:t>3/15/2017</a:t>
             </a:fld>
             <a:endParaRPr lang="en-US"/>
           </a:p>
@@ -1423,7 +1423,7 @@
           <a:p>
             <a:fld id="{78C97017-6FC3-485B-9764-EAC9E56C1D49}" type="datetimeFigureOut">
               <a:rPr lang="en-US" smtClean="0"/>
-              <a:t>2/2/2017</a:t>
+              <a:t>3/15/2017</a:t>
             </a:fld>
             <a:endParaRPr lang="en-US"/>
           </a:p>
@@ -1711,7 +1711,7 @@
           <a:p>
             <a:fld id="{78C97017-6FC3-485B-9764-EAC9E56C1D49}" type="datetimeFigureOut">
               <a:rPr lang="en-US" smtClean="0"/>
-              <a:t>2/2/2017</a:t>
+              <a:t>3/15/2017</a:t>
             </a:fld>
             <a:endParaRPr lang="en-US"/>
           </a:p>
@@ -2133,7 +2133,7 @@
           <a:p>
             <a:fld id="{78C97017-6FC3-485B-9764-EAC9E56C1D49}" type="datetimeFigureOut">
               <a:rPr lang="en-US" smtClean="0"/>
-              <a:t>2/2/2017</a:t>
+              <a:t>3/15/2017</a:t>
             </a:fld>
             <a:endParaRPr lang="en-US"/>
           </a:p>
@@ -2251,7 +2251,7 @@
           <a:p>
             <a:fld id="{78C97017-6FC3-485B-9764-EAC9E56C1D49}" type="datetimeFigureOut">
               <a:rPr lang="en-US" smtClean="0"/>
-              <a:t>2/2/2017</a:t>
+              <a:t>3/15/2017</a:t>
             </a:fld>
             <a:endParaRPr lang="en-US"/>
           </a:p>
@@ -2346,7 +2346,7 @@
           <a:p>
             <a:fld id="{78C97017-6FC3-485B-9764-EAC9E56C1D49}" type="datetimeFigureOut">
               <a:rPr lang="en-US" smtClean="0"/>
-              <a:t>2/2/2017</a:t>
+              <a:t>3/15/2017</a:t>
             </a:fld>
             <a:endParaRPr lang="en-US"/>
           </a:p>
@@ -2623,7 +2623,7 @@
           <a:p>
             <a:fld id="{78C97017-6FC3-485B-9764-EAC9E56C1D49}" type="datetimeFigureOut">
               <a:rPr lang="en-US" smtClean="0"/>
-              <a:t>2/2/2017</a:t>
+              <a:t>3/15/2017</a:t>
             </a:fld>
             <a:endParaRPr lang="en-US"/>
           </a:p>
@@ -2876,7 +2876,7 @@
           <a:p>
             <a:fld id="{78C97017-6FC3-485B-9764-EAC9E56C1D49}" type="datetimeFigureOut">
               <a:rPr lang="en-US" smtClean="0"/>
-              <a:t>2/2/2017</a:t>
+              <a:t>3/15/2017</a:t>
             </a:fld>
             <a:endParaRPr lang="en-US"/>
           </a:p>
@@ -3089,7 +3089,7 @@
           <a:p>
             <a:fld id="{78C97017-6FC3-485B-9764-EAC9E56C1D49}" type="datetimeFigureOut">
               <a:rPr lang="en-US" smtClean="0"/>
-              <a:t>2/2/2017</a:t>
+              <a:t>3/15/2017</a:t>
             </a:fld>
             <a:endParaRPr lang="en-US"/>
           </a:p>

</xml_diff>

<commit_message>
Upload logic component class diagram ppt
</commit_message>
<xml_diff>
--- a/docs/diagrams/LogicComponentClassDiagram.pptx
+++ b/docs/diagrams/LogicComponentClassDiagram.pptx
@@ -208,7 +208,7 @@
           <a:p>
             <a:fld id="{F5CC4B3F-88C1-4FFA-B1B6-F41C21DC6924}" type="datetimeFigureOut">
               <a:rPr lang="en-US" smtClean="0"/>
-              <a:t>2/2/2017</a:t>
+              <a:t>3/24/17</a:t>
             </a:fld>
             <a:endParaRPr lang="en-US"/>
           </a:p>
@@ -657,7 +657,7 @@
           <a:p>
             <a:fld id="{78C97017-6FC3-485B-9764-EAC9E56C1D49}" type="datetimeFigureOut">
               <a:rPr lang="en-US" smtClean="0"/>
-              <a:t>2/2/2017</a:t>
+              <a:t>3/24/17</a:t>
             </a:fld>
             <a:endParaRPr lang="en-US"/>
           </a:p>
@@ -827,7 +827,7 @@
           <a:p>
             <a:fld id="{78C97017-6FC3-485B-9764-EAC9E56C1D49}" type="datetimeFigureOut">
               <a:rPr lang="en-US" smtClean="0"/>
-              <a:t>2/2/2017</a:t>
+              <a:t>3/24/17</a:t>
             </a:fld>
             <a:endParaRPr lang="en-US"/>
           </a:p>
@@ -1007,7 +1007,7 @@
           <a:p>
             <a:fld id="{78C97017-6FC3-485B-9764-EAC9E56C1D49}" type="datetimeFigureOut">
               <a:rPr lang="en-US" smtClean="0"/>
-              <a:t>2/2/2017</a:t>
+              <a:t>3/24/17</a:t>
             </a:fld>
             <a:endParaRPr lang="en-US"/>
           </a:p>
@@ -1177,7 +1177,7 @@
           <a:p>
             <a:fld id="{78C97017-6FC3-485B-9764-EAC9E56C1D49}" type="datetimeFigureOut">
               <a:rPr lang="en-US" smtClean="0"/>
-              <a:t>2/2/2017</a:t>
+              <a:t>3/24/17</a:t>
             </a:fld>
             <a:endParaRPr lang="en-US"/>
           </a:p>
@@ -1423,7 +1423,7 @@
           <a:p>
             <a:fld id="{78C97017-6FC3-485B-9764-EAC9E56C1D49}" type="datetimeFigureOut">
               <a:rPr lang="en-US" smtClean="0"/>
-              <a:t>2/2/2017</a:t>
+              <a:t>3/24/17</a:t>
             </a:fld>
             <a:endParaRPr lang="en-US"/>
           </a:p>
@@ -1711,7 +1711,7 @@
           <a:p>
             <a:fld id="{78C97017-6FC3-485B-9764-EAC9E56C1D49}" type="datetimeFigureOut">
               <a:rPr lang="en-US" smtClean="0"/>
-              <a:t>2/2/2017</a:t>
+              <a:t>3/24/17</a:t>
             </a:fld>
             <a:endParaRPr lang="en-US"/>
           </a:p>
@@ -2133,7 +2133,7 @@
           <a:p>
             <a:fld id="{78C97017-6FC3-485B-9764-EAC9E56C1D49}" type="datetimeFigureOut">
               <a:rPr lang="en-US" smtClean="0"/>
-              <a:t>2/2/2017</a:t>
+              <a:t>3/24/17</a:t>
             </a:fld>
             <a:endParaRPr lang="en-US"/>
           </a:p>
@@ -2251,7 +2251,7 @@
           <a:p>
             <a:fld id="{78C97017-6FC3-485B-9764-EAC9E56C1D49}" type="datetimeFigureOut">
               <a:rPr lang="en-US" smtClean="0"/>
-              <a:t>2/2/2017</a:t>
+              <a:t>3/24/17</a:t>
             </a:fld>
             <a:endParaRPr lang="en-US"/>
           </a:p>
@@ -2346,7 +2346,7 @@
           <a:p>
             <a:fld id="{78C97017-6FC3-485B-9764-EAC9E56C1D49}" type="datetimeFigureOut">
               <a:rPr lang="en-US" smtClean="0"/>
-              <a:t>2/2/2017</a:t>
+              <a:t>3/24/17</a:t>
             </a:fld>
             <a:endParaRPr lang="en-US"/>
           </a:p>
@@ -2623,7 +2623,7 @@
           <a:p>
             <a:fld id="{78C97017-6FC3-485B-9764-EAC9E56C1D49}" type="datetimeFigureOut">
               <a:rPr lang="en-US" smtClean="0"/>
-              <a:t>2/2/2017</a:t>
+              <a:t>3/24/17</a:t>
             </a:fld>
             <a:endParaRPr lang="en-US"/>
           </a:p>
@@ -2876,7 +2876,7 @@
           <a:p>
             <a:fld id="{78C97017-6FC3-485B-9764-EAC9E56C1D49}" type="datetimeFigureOut">
               <a:rPr lang="en-US" smtClean="0"/>
-              <a:t>2/2/2017</a:t>
+              <a:t>3/24/17</a:t>
             </a:fld>
             <a:endParaRPr lang="en-US"/>
           </a:p>
@@ -3089,7 +3089,7 @@
           <a:p>
             <a:fld id="{78C97017-6FC3-485B-9764-EAC9E56C1D49}" type="datetimeFigureOut">
               <a:rPr lang="en-US" smtClean="0"/>
-              <a:t>2/2/2017</a:t>
+              <a:t>3/24/17</a:t>
             </a:fld>
             <a:endParaRPr lang="en-US"/>
           </a:p>
@@ -3472,8 +3472,8 @@
         </p:nvSpPr>
         <p:spPr>
           <a:xfrm>
-            <a:off x="1066800" y="914400"/>
-            <a:ext cx="7467600" cy="3733800"/>
+            <a:off x="711161" y="705142"/>
+            <a:ext cx="7449457" cy="4472555"/>
           </a:xfrm>
           <a:prstGeom prst="roundRect">
             <a:avLst>
@@ -3533,7 +3533,7 @@
         </p:nvSpPr>
         <p:spPr>
           <a:xfrm>
-            <a:off x="2095948" y="1253067"/>
+            <a:off x="1545089" y="911951"/>
             <a:ext cx="1093635" cy="346760"/>
           </a:xfrm>
           <a:prstGeom prst="rect">
@@ -3592,7 +3592,7 @@
         </p:nvSpPr>
         <p:spPr>
           <a:xfrm flipH="1">
-            <a:off x="6520227" y="2149167"/>
+            <a:off x="6160316" y="2149167"/>
             <a:ext cx="1093635" cy="346760"/>
           </a:xfrm>
           <a:prstGeom prst="rect">
@@ -3648,7 +3648,7 @@
         </p:nvSpPr>
         <p:spPr>
           <a:xfrm>
-            <a:off x="1780785" y="3772963"/>
+            <a:off x="1149835" y="4318426"/>
             <a:ext cx="1093635" cy="346760"/>
           </a:xfrm>
           <a:prstGeom prst="rect">
@@ -3710,12 +3710,12 @@
         </p:nvCxnSpPr>
         <p:spPr>
           <a:xfrm flipH="1" flipV="1">
-            <a:off x="3189583" y="1426447"/>
-            <a:ext cx="5020699" cy="2895973"/>
+            <a:off x="2638724" y="1085331"/>
+            <a:ext cx="5204440" cy="3712178"/>
           </a:xfrm>
           <a:prstGeom prst="bentConnector3">
             <a:avLst>
-              <a:gd name="adj1" fmla="val -2713"/>
+              <a:gd name="adj1" fmla="val -4392"/>
             </a:avLst>
           </a:prstGeom>
           <a:ln w="19050">
@@ -3753,7 +3753,7 @@
         </p:nvCxnSpPr>
         <p:spPr>
           <a:xfrm>
-            <a:off x="1676400" y="1423587"/>
+            <a:off x="1125541" y="1082471"/>
             <a:ext cx="419548" cy="2860"/>
           </a:xfrm>
           <a:prstGeom prst="bentConnector3">
@@ -3794,7 +3794,7 @@
         </p:nvSpPr>
         <p:spPr>
           <a:xfrm>
-            <a:off x="1103085" y="4777355"/>
+            <a:off x="729303" y="5350569"/>
             <a:ext cx="7431315" cy="328045"/>
           </a:xfrm>
           <a:prstGeom prst="roundRect">
@@ -3854,7 +3854,7 @@
         </p:nvSpPr>
         <p:spPr>
           <a:xfrm flipH="1">
-            <a:off x="6526365" y="2554920"/>
+            <a:off x="6166454" y="2554920"/>
             <a:ext cx="1093635" cy="346760"/>
           </a:xfrm>
           <a:prstGeom prst="rect">
@@ -3910,7 +3910,7 @@
         </p:nvSpPr>
         <p:spPr>
           <a:xfrm flipH="1">
-            <a:off x="6526365" y="3396383"/>
+            <a:off x="6166454" y="3396383"/>
             <a:ext cx="1093635" cy="346760"/>
           </a:xfrm>
           <a:prstGeom prst="rect">
@@ -3981,8 +3981,8 @@
         </p:nvSpPr>
         <p:spPr>
           <a:xfrm>
-            <a:off x="7438239" y="4149040"/>
-            <a:ext cx="772043" cy="346760"/>
+            <a:off x="7071121" y="4586012"/>
+            <a:ext cx="772043" cy="422994"/>
           </a:xfrm>
           <a:prstGeom prst="rect">
             <a:avLst/>
@@ -4052,7 +4052,7 @@
         </p:nvSpPr>
         <p:spPr>
           <a:xfrm>
-            <a:off x="3529350" y="3775502"/>
+            <a:off x="3244875" y="4320000"/>
             <a:ext cx="585450" cy="346760"/>
           </a:xfrm>
           <a:prstGeom prst="rect">
@@ -4110,8 +4110,8 @@
         </p:nvCxnSpPr>
         <p:spPr>
           <a:xfrm>
-            <a:off x="2874420" y="3946343"/>
-            <a:ext cx="654930" cy="2539"/>
+            <a:off x="2243470" y="4491806"/>
+            <a:ext cx="1001405" cy="1574"/>
           </a:xfrm>
           <a:prstGeom prst="bentConnector3">
             <a:avLst>
@@ -4152,9 +4152,9 @@
           <p:nvPr/>
         </p:nvCxnSpPr>
         <p:spPr>
-          <a:xfrm>
-            <a:off x="7824261" y="4495800"/>
-            <a:ext cx="0" cy="281555"/>
+          <a:xfrm flipH="1">
+            <a:off x="7452955" y="5009006"/>
+            <a:ext cx="4188" cy="353940"/>
           </a:xfrm>
           <a:prstGeom prst="straightConnector1">
             <a:avLst/>
@@ -4192,8 +4192,8 @@
         </p:nvSpPr>
         <p:spPr>
           <a:xfrm rot="16200000">
-            <a:off x="398120" y="2150720"/>
-            <a:ext cx="2209800" cy="346760"/>
+            <a:off x="-49630" y="2062881"/>
+            <a:ext cx="2385478" cy="346760"/>
           </a:xfrm>
           <a:prstGeom prst="rect">
             <a:avLst/>
@@ -4262,7 +4262,7 @@
         </p:nvSpPr>
         <p:spPr>
           <a:xfrm>
-            <a:off x="1359039" y="3429000"/>
+            <a:off x="999128" y="3429000"/>
             <a:ext cx="270504" cy="175523"/>
           </a:xfrm>
           <a:prstGeom prst="triangle">
@@ -4319,8 +4319,8 @@
         </p:nvCxnSpPr>
         <p:spPr>
           <a:xfrm rot="10800000">
-            <a:off x="1494291" y="3604523"/>
-            <a:ext cx="286494" cy="341820"/>
+            <a:off x="1134381" y="3604524"/>
+            <a:ext cx="15455" cy="887283"/>
           </a:xfrm>
           <a:prstGeom prst="bentConnector2">
             <a:avLst/>
@@ -4357,9 +4357,9 @@
           <p:nvPr/>
         </p:nvCxnSpPr>
         <p:spPr>
-          <a:xfrm flipH="1">
-            <a:off x="1981201" y="4122262"/>
-            <a:ext cx="1" cy="655093"/>
+          <a:xfrm>
+            <a:off x="1543441" y="4667725"/>
+            <a:ext cx="4188" cy="695221"/>
           </a:xfrm>
           <a:prstGeom prst="straightConnector1">
             <a:avLst/>
@@ -4396,7 +4396,7 @@
         </p:nvCxnSpPr>
         <p:spPr>
           <a:xfrm>
-            <a:off x="893311" y="2832505"/>
+            <a:off x="533400" y="2832505"/>
             <a:ext cx="419548" cy="2860"/>
           </a:xfrm>
           <a:prstGeom prst="bentConnector3">
@@ -4442,8 +4442,8 @@
         </p:nvCxnSpPr>
         <p:spPr>
           <a:xfrm rot="16200000" flipH="1">
-            <a:off x="4781573" y="1665753"/>
-            <a:ext cx="202697" cy="5110636"/>
+            <a:off x="4317726" y="2044113"/>
+            <a:ext cx="132323" cy="5374468"/>
           </a:xfrm>
           <a:prstGeom prst="bentConnector2">
             <a:avLst/>
@@ -4481,10 +4481,10 @@
         </p:nvGrpSpPr>
         <p:grpSpPr>
           <a:xfrm>
-            <a:off x="4597400" y="4341168"/>
-            <a:ext cx="889000" cy="230832"/>
-            <a:chOff x="2895600" y="807932"/>
-            <a:chExt cx="889000" cy="230832"/>
+            <a:off x="4135889" y="4857149"/>
+            <a:ext cx="914400" cy="230832"/>
+            <a:chOff x="2870200" y="863838"/>
+            <a:chExt cx="914400" cy="230832"/>
           </a:xfrm>
         </p:grpSpPr>
         <p:sp>
@@ -4495,7 +4495,7 @@
           </p:nvSpPr>
           <p:spPr>
             <a:xfrm>
-              <a:off x="2895600" y="807932"/>
+              <a:off x="2870200" y="863838"/>
               <a:ext cx="728806" cy="230832"/>
             </a:xfrm>
             <a:prstGeom prst="rect">
@@ -4534,7 +4534,7 @@
           </p:nvSpPr>
           <p:spPr>
             <a:xfrm rot="5400000">
-              <a:off x="3683524" y="866776"/>
+              <a:off x="3683524" y="911239"/>
               <a:ext cx="125951" cy="76201"/>
             </a:xfrm>
             <a:prstGeom prst="triangle">
@@ -4581,7 +4581,7 @@
         </p:nvGrpSpPr>
         <p:grpSpPr>
           <a:xfrm>
-            <a:off x="4665110" y="1219200"/>
+            <a:off x="4305199" y="838200"/>
             <a:ext cx="868568" cy="230832"/>
             <a:chOff x="2755838" y="789460"/>
             <a:chExt cx="868568" cy="230832"/>
@@ -4680,7 +4680,7 @@
         </p:nvSpPr>
         <p:spPr>
           <a:xfrm>
-            <a:off x="2301175" y="1618473"/>
+            <a:off x="1621289" y="1445568"/>
             <a:ext cx="131116" cy="230832"/>
           </a:xfrm>
           <a:prstGeom prst="rect">
@@ -4719,7 +4719,7 @@
         </p:nvSpPr>
         <p:spPr>
           <a:xfrm>
-            <a:off x="2912207" y="3709457"/>
+            <a:off x="2307089" y="4279351"/>
             <a:ext cx="131116" cy="230832"/>
           </a:xfrm>
           <a:prstGeom prst="rect">
@@ -4758,7 +4758,7 @@
         </p:nvSpPr>
         <p:spPr>
           <a:xfrm flipH="1">
-            <a:off x="6526365" y="2956137"/>
+            <a:off x="6166454" y="2956137"/>
             <a:ext cx="1093635" cy="346760"/>
           </a:xfrm>
           <a:prstGeom prst="rect">
@@ -4813,9 +4813,9 @@
           <p:nvPr/>
         </p:nvCxnSpPr>
         <p:spPr>
-          <a:xfrm rot="16200000" flipV="1">
-            <a:off x="1105538" y="2692369"/>
-            <a:ext cx="2147794" cy="2"/>
+          <a:xfrm rot="5400000" flipH="1" flipV="1">
+            <a:off x="122763" y="2796159"/>
+            <a:ext cx="2998546" cy="1493"/>
           </a:xfrm>
           <a:prstGeom prst="bentConnector3">
             <a:avLst>
@@ -4855,7 +4855,7 @@
         </p:nvSpPr>
         <p:spPr>
           <a:xfrm flipH="1">
-            <a:off x="4664592" y="2148937"/>
+            <a:off x="4304681" y="2148937"/>
             <a:ext cx="1093635" cy="346760"/>
           </a:xfrm>
           <a:prstGeom prst="rect">
@@ -4926,7 +4926,7 @@
         </p:nvSpPr>
         <p:spPr>
           <a:xfrm flipH="1">
-            <a:off x="4664592" y="2555337"/>
+            <a:off x="4304681" y="2555337"/>
             <a:ext cx="1093635" cy="346760"/>
           </a:xfrm>
           <a:prstGeom prst="rect">
@@ -4997,7 +4997,7 @@
         </p:nvSpPr>
         <p:spPr>
           <a:xfrm flipH="1">
-            <a:off x="4664590" y="2977582"/>
+            <a:off x="4304679" y="2977582"/>
             <a:ext cx="1093635" cy="346760"/>
           </a:xfrm>
           <a:prstGeom prst="rect">
@@ -5052,7 +5052,7 @@
         </p:nvSpPr>
         <p:spPr>
           <a:xfrm>
-            <a:off x="2807288" y="1905000"/>
+            <a:off x="2447377" y="1905000"/>
             <a:ext cx="751107" cy="346760"/>
           </a:xfrm>
           <a:prstGeom prst="rect">
@@ -5132,7 +5132,7 @@
         </p:nvSpPr>
         <p:spPr>
           <a:xfrm>
-            <a:off x="2813291" y="2432664"/>
+            <a:off x="2453380" y="2432664"/>
             <a:ext cx="726243" cy="174580"/>
           </a:xfrm>
           <a:prstGeom prst="rect">
@@ -5197,7 +5197,7 @@
         </p:nvGrpSpPr>
         <p:grpSpPr>
           <a:xfrm rot="5400000">
-            <a:off x="5941795" y="1962201"/>
+            <a:off x="5581884" y="1962201"/>
             <a:ext cx="254462" cy="555486"/>
             <a:chOff x="3949242" y="712012"/>
             <a:chExt cx="254462" cy="503902"/>
@@ -5302,7 +5302,7 @@
         </p:nvGrpSpPr>
         <p:grpSpPr>
           <a:xfrm rot="5400000">
-            <a:off x="5962853" y="2347569"/>
+            <a:off x="5602942" y="2347569"/>
             <a:ext cx="254462" cy="555486"/>
             <a:chOff x="3949242" y="712012"/>
             <a:chExt cx="254462" cy="503902"/>
@@ -5407,7 +5407,7 @@
         </p:nvSpPr>
         <p:spPr>
           <a:xfrm>
-            <a:off x="2819400" y="2841725"/>
+            <a:off x="2459489" y="2841725"/>
             <a:ext cx="731636" cy="283820"/>
           </a:xfrm>
           <a:prstGeom prst="rect">
@@ -5472,7 +5472,7 @@
         </p:nvSpPr>
         <p:spPr>
           <a:xfrm>
-            <a:off x="2819400" y="3190882"/>
+            <a:off x="2459489" y="3190882"/>
             <a:ext cx="731636" cy="283820"/>
           </a:xfrm>
           <a:prstGeom prst="rect">
@@ -5539,7 +5539,7 @@
         </p:nvCxnSpPr>
         <p:spPr>
           <a:xfrm flipH="1">
-            <a:off x="3551036" y="2983635"/>
+            <a:off x="3191125" y="2983635"/>
             <a:ext cx="335164" cy="0"/>
           </a:xfrm>
           <a:prstGeom prst="straightConnector1">
@@ -5580,7 +5580,7 @@
         </p:nvCxnSpPr>
         <p:spPr>
           <a:xfrm flipH="1" flipV="1">
-            <a:off x="3558396" y="3297471"/>
+            <a:off x="3198485" y="3297471"/>
             <a:ext cx="327804" cy="5426"/>
           </a:xfrm>
           <a:prstGeom prst="straightConnector1">
@@ -5623,7 +5623,7 @@
         </p:nvCxnSpPr>
         <p:spPr>
           <a:xfrm rot="16200000" flipV="1">
-            <a:off x="3063575" y="2720082"/>
+            <a:off x="2703664" y="2720082"/>
             <a:ext cx="234481" cy="8806"/>
           </a:xfrm>
           <a:prstGeom prst="bentConnector3">
@@ -5667,7 +5667,7 @@
         </p:nvCxnSpPr>
         <p:spPr>
           <a:xfrm>
-            <a:off x="3539534" y="2078487"/>
+            <a:off x="3179623" y="2078487"/>
             <a:ext cx="346666" cy="0"/>
           </a:xfrm>
           <a:prstGeom prst="line">
@@ -5711,7 +5711,7 @@
         </p:nvCxnSpPr>
         <p:spPr>
           <a:xfrm rot="5400000">
-            <a:off x="3089176" y="2338998"/>
+            <a:off x="2729265" y="2338998"/>
             <a:ext cx="180904" cy="6429"/>
           </a:xfrm>
           <a:prstGeom prst="bentConnector3">
@@ -5755,7 +5755,7 @@
         </p:nvGrpSpPr>
         <p:grpSpPr>
           <a:xfrm rot="5400000">
-            <a:off x="4090826" y="3633626"/>
+            <a:off x="3679811" y="3427112"/>
             <a:ext cx="555486" cy="254462"/>
             <a:chOff x="3798139" y="875689"/>
             <a:chExt cx="555486" cy="230832"/>
@@ -5863,8 +5863,8 @@
         </p:nvCxnSpPr>
         <p:spPr>
           <a:xfrm rot="16200000" flipV="1">
-            <a:off x="7296652" y="3452865"/>
-            <a:ext cx="850958" cy="204262"/>
+            <a:off x="6800332" y="3589275"/>
+            <a:ext cx="1142113" cy="222597"/>
           </a:xfrm>
           <a:prstGeom prst="bentConnector2">
             <a:avLst/>
@@ -5897,8 +5897,8 @@
         </p:nvSpPr>
         <p:spPr>
           <a:xfrm flipV="1">
-            <a:off x="7689010" y="3980475"/>
-            <a:ext cx="270504" cy="175523"/>
+            <a:off x="7347434" y="4271630"/>
+            <a:ext cx="270504" cy="276830"/>
           </a:xfrm>
           <a:prstGeom prst="triangle">
             <a:avLst/>
@@ -5954,8 +5954,8 @@
         </p:nvCxnSpPr>
         <p:spPr>
           <a:xfrm rot="16200000" flipV="1">
-            <a:off x="7516775" y="3672988"/>
-            <a:ext cx="410712" cy="204262"/>
+            <a:off x="7020455" y="3809398"/>
+            <a:ext cx="701867" cy="222597"/>
           </a:xfrm>
           <a:prstGeom prst="bentConnector2">
             <a:avLst/>
@@ -5991,8 +5991,8 @@
         </p:nvCxnSpPr>
         <p:spPr>
           <a:xfrm rot="16200000" flipV="1">
-            <a:off x="7096044" y="3252257"/>
-            <a:ext cx="1252175" cy="204262"/>
+            <a:off x="6599723" y="3388666"/>
+            <a:ext cx="1543330" cy="222597"/>
           </a:xfrm>
           <a:prstGeom prst="bentConnector2">
             <a:avLst/>
@@ -6028,8 +6028,8 @@
         </p:nvCxnSpPr>
         <p:spPr>
           <a:xfrm rot="16200000" flipV="1">
-            <a:off x="6890098" y="3046311"/>
-            <a:ext cx="1657928" cy="210400"/>
+            <a:off x="6393778" y="3182721"/>
+            <a:ext cx="1949083" cy="228735"/>
           </a:xfrm>
           <a:prstGeom prst="bentConnector2">
             <a:avLst/>
@@ -6065,146 +6065,8 @@
         </p:nvCxnSpPr>
         <p:spPr>
           <a:xfrm flipV="1">
-            <a:off x="4114800" y="3150962"/>
-            <a:ext cx="549790" cy="797920"/>
-          </a:xfrm>
-          <a:prstGeom prst="bentConnector3">
-            <a:avLst>
-              <a:gd name="adj1" fmla="val 14720"/>
-            </a:avLst>
-          </a:prstGeom>
-          <a:ln w="19050">
-            <a:solidFill>
-              <a:schemeClr val="accent5">
-                <a:lumMod val="75000"/>
-              </a:schemeClr>
-            </a:solidFill>
-            <a:prstDash val="sysDot"/>
-            <a:headEnd type="none" w="med" len="med"/>
-            <a:tailEnd type="arrow" w="med" len="med"/>
-          </a:ln>
-          <a:effectLst/>
-        </p:spPr>
-        <p:style>
-          <a:lnRef idx="1">
-            <a:schemeClr val="accent2"/>
-          </a:lnRef>
-          <a:fillRef idx="2">
-            <a:schemeClr val="accent2"/>
-          </a:fillRef>
-          <a:effectRef idx="1">
-            <a:schemeClr val="accent2"/>
-          </a:effectRef>
-          <a:fontRef idx="minor">
-            <a:schemeClr val="dk1"/>
-          </a:fontRef>
-        </p:style>
-      </p:cxnSp>
-      <p:cxnSp>
-        <p:nvCxnSpPr>
-          <p:cNvPr id="113" name="Elbow Connector 63"/>
-          <p:cNvCxnSpPr>
-            <a:stCxn id="16" idx="3"/>
-            <a:endCxn id="44" idx="3"/>
-          </p:cNvCxnSpPr>
-          <p:nvPr/>
-        </p:nvCxnSpPr>
-        <p:spPr>
-          <a:xfrm flipV="1">
-            <a:off x="4114800" y="2728717"/>
-            <a:ext cx="549792" cy="1220165"/>
-          </a:xfrm>
-          <a:prstGeom prst="bentConnector3">
-            <a:avLst>
-              <a:gd name="adj1" fmla="val 14720"/>
-            </a:avLst>
-          </a:prstGeom>
-          <a:ln w="19050">
-            <a:solidFill>
-              <a:schemeClr val="accent5">
-                <a:lumMod val="75000"/>
-              </a:schemeClr>
-            </a:solidFill>
-            <a:prstDash val="sysDot"/>
-            <a:headEnd type="none" w="med" len="med"/>
-            <a:tailEnd type="arrow" w="med" len="med"/>
-          </a:ln>
-          <a:effectLst/>
-        </p:spPr>
-        <p:style>
-          <a:lnRef idx="1">
-            <a:schemeClr val="accent2"/>
-          </a:lnRef>
-          <a:fillRef idx="2">
-            <a:schemeClr val="accent2"/>
-          </a:fillRef>
-          <a:effectRef idx="1">
-            <a:schemeClr val="accent2"/>
-          </a:effectRef>
-          <a:fontRef idx="minor">
-            <a:schemeClr val="dk1"/>
-          </a:fontRef>
-        </p:style>
-      </p:cxnSp>
-      <p:cxnSp>
-        <p:nvCxnSpPr>
-          <p:cNvPr id="116" name="Elbow Connector 63"/>
-          <p:cNvCxnSpPr>
-            <a:stCxn id="16" idx="3"/>
-            <a:endCxn id="42" idx="3"/>
-          </p:cNvCxnSpPr>
-          <p:nvPr/>
-        </p:nvCxnSpPr>
-        <p:spPr>
-          <a:xfrm flipV="1">
-            <a:off x="4114800" y="2322317"/>
-            <a:ext cx="549792" cy="1626565"/>
-          </a:xfrm>
-          <a:prstGeom prst="bentConnector3">
-            <a:avLst>
-              <a:gd name="adj1" fmla="val 14721"/>
-            </a:avLst>
-          </a:prstGeom>
-          <a:ln w="19050">
-            <a:solidFill>
-              <a:schemeClr val="accent5">
-                <a:lumMod val="75000"/>
-              </a:schemeClr>
-            </a:solidFill>
-            <a:prstDash val="sysDot"/>
-            <a:headEnd type="none" w="med" len="med"/>
-            <a:tailEnd type="arrow" w="med" len="med"/>
-          </a:ln>
-          <a:effectLst/>
-        </p:spPr>
-        <p:style>
-          <a:lnRef idx="1">
-            <a:schemeClr val="accent2"/>
-          </a:lnRef>
-          <a:fillRef idx="2">
-            <a:schemeClr val="accent2"/>
-          </a:fillRef>
-          <a:effectRef idx="1">
-            <a:schemeClr val="accent2"/>
-          </a:effectRef>
-          <a:fontRef idx="minor">
-            <a:schemeClr val="dk1"/>
-          </a:fontRef>
-        </p:style>
-      </p:cxnSp>
-      <p:cxnSp>
-        <p:nvCxnSpPr>
-          <p:cNvPr id="120" name="Elbow Connector 63"/>
-          <p:cNvCxnSpPr>
-            <a:stCxn id="44" idx="1"/>
-            <a:endCxn id="10" idx="3"/>
-          </p:cNvCxnSpPr>
-          <p:nvPr/>
-        </p:nvCxnSpPr>
-        <p:spPr>
-          <a:xfrm flipV="1">
-            <a:off x="5758227" y="2728300"/>
-            <a:ext cx="768138" cy="417"/>
+            <a:off x="3830325" y="3150962"/>
+            <a:ext cx="474354" cy="1342418"/>
           </a:xfrm>
           <a:prstGeom prst="bentConnector3">
             <a:avLst>
@@ -6240,17 +6102,17 @@
       </p:cxnSp>
       <p:cxnSp>
         <p:nvCxnSpPr>
-          <p:cNvPr id="122" name="Elbow Connector 63"/>
+          <p:cNvPr id="113" name="Elbow Connector 63"/>
           <p:cNvCxnSpPr>
-            <a:stCxn id="42" idx="1"/>
-            <a:endCxn id="4" idx="3"/>
+            <a:stCxn id="16" idx="3"/>
+            <a:endCxn id="44" idx="3"/>
           </p:cNvCxnSpPr>
           <p:nvPr/>
         </p:nvCxnSpPr>
         <p:spPr>
-          <a:xfrm>
-            <a:off x="5758227" y="2322317"/>
-            <a:ext cx="762000" cy="230"/>
+          <a:xfrm flipV="1">
+            <a:off x="3830325" y="2728717"/>
+            <a:ext cx="474356" cy="1764663"/>
           </a:xfrm>
           <a:prstGeom prst="bentConnector3">
             <a:avLst>
@@ -6286,13 +6148,151 @@
       </p:cxnSp>
       <p:cxnSp>
         <p:nvCxnSpPr>
+          <p:cNvPr id="116" name="Elbow Connector 63"/>
+          <p:cNvCxnSpPr>
+            <a:stCxn id="16" idx="3"/>
+            <a:endCxn id="42" idx="3"/>
+          </p:cNvCxnSpPr>
+          <p:nvPr/>
+        </p:nvCxnSpPr>
+        <p:spPr>
+          <a:xfrm flipV="1">
+            <a:off x="3830325" y="2322317"/>
+            <a:ext cx="474356" cy="2171063"/>
+          </a:xfrm>
+          <a:prstGeom prst="bentConnector3">
+            <a:avLst>
+              <a:gd name="adj1" fmla="val 50000"/>
+            </a:avLst>
+          </a:prstGeom>
+          <a:ln w="19050">
+            <a:solidFill>
+              <a:schemeClr val="accent5">
+                <a:lumMod val="75000"/>
+              </a:schemeClr>
+            </a:solidFill>
+            <a:prstDash val="sysDot"/>
+            <a:headEnd type="none" w="med" len="med"/>
+            <a:tailEnd type="arrow" w="med" len="med"/>
+          </a:ln>
+          <a:effectLst/>
+        </p:spPr>
+        <p:style>
+          <a:lnRef idx="1">
+            <a:schemeClr val="accent2"/>
+          </a:lnRef>
+          <a:fillRef idx="2">
+            <a:schemeClr val="accent2"/>
+          </a:fillRef>
+          <a:effectRef idx="1">
+            <a:schemeClr val="accent2"/>
+          </a:effectRef>
+          <a:fontRef idx="minor">
+            <a:schemeClr val="dk1"/>
+          </a:fontRef>
+        </p:style>
+      </p:cxnSp>
+      <p:cxnSp>
+        <p:nvCxnSpPr>
+          <p:cNvPr id="120" name="Elbow Connector 63"/>
+          <p:cNvCxnSpPr>
+            <a:stCxn id="44" idx="1"/>
+            <a:endCxn id="10" idx="3"/>
+          </p:cNvCxnSpPr>
+          <p:nvPr/>
+        </p:nvCxnSpPr>
+        <p:spPr>
+          <a:xfrm flipV="1">
+            <a:off x="5398316" y="2728300"/>
+            <a:ext cx="768138" cy="417"/>
+          </a:xfrm>
+          <a:prstGeom prst="bentConnector3">
+            <a:avLst>
+              <a:gd name="adj1" fmla="val 50000"/>
+            </a:avLst>
+          </a:prstGeom>
+          <a:ln w="19050">
+            <a:solidFill>
+              <a:schemeClr val="accent5">
+                <a:lumMod val="75000"/>
+              </a:schemeClr>
+            </a:solidFill>
+            <a:prstDash val="sysDot"/>
+            <a:headEnd type="none" w="med" len="med"/>
+            <a:tailEnd type="arrow" w="med" len="med"/>
+          </a:ln>
+          <a:effectLst/>
+        </p:spPr>
+        <p:style>
+          <a:lnRef idx="1">
+            <a:schemeClr val="accent2"/>
+          </a:lnRef>
+          <a:fillRef idx="2">
+            <a:schemeClr val="accent2"/>
+          </a:fillRef>
+          <a:effectRef idx="1">
+            <a:schemeClr val="accent2"/>
+          </a:effectRef>
+          <a:fontRef idx="minor">
+            <a:schemeClr val="dk1"/>
+          </a:fontRef>
+        </p:style>
+      </p:cxnSp>
+      <p:cxnSp>
+        <p:nvCxnSpPr>
+          <p:cNvPr id="122" name="Elbow Connector 63"/>
+          <p:cNvCxnSpPr>
+            <a:stCxn id="42" idx="1"/>
+            <a:endCxn id="4" idx="3"/>
+          </p:cNvCxnSpPr>
+          <p:nvPr/>
+        </p:nvCxnSpPr>
+        <p:spPr>
+          <a:xfrm>
+            <a:off x="5398316" y="2322317"/>
+            <a:ext cx="762000" cy="230"/>
+          </a:xfrm>
+          <a:prstGeom prst="bentConnector3">
+            <a:avLst>
+              <a:gd name="adj1" fmla="val 50000"/>
+            </a:avLst>
+          </a:prstGeom>
+          <a:ln w="19050">
+            <a:solidFill>
+              <a:schemeClr val="accent5">
+                <a:lumMod val="75000"/>
+              </a:schemeClr>
+            </a:solidFill>
+            <a:prstDash val="sysDot"/>
+            <a:headEnd type="none" w="med" len="med"/>
+            <a:tailEnd type="arrow" w="med" len="med"/>
+          </a:ln>
+          <a:effectLst/>
+        </p:spPr>
+        <p:style>
+          <a:lnRef idx="1">
+            <a:schemeClr val="accent2"/>
+          </a:lnRef>
+          <a:fillRef idx="2">
+            <a:schemeClr val="accent2"/>
+          </a:fillRef>
+          <a:effectRef idx="1">
+            <a:schemeClr val="accent2"/>
+          </a:effectRef>
+          <a:fontRef idx="minor">
+            <a:schemeClr val="dk1"/>
+          </a:fontRef>
+        </p:style>
+      </p:cxnSp>
+      <p:cxnSp>
+        <p:nvCxnSpPr>
           <p:cNvPr id="64" name="Straight Connector 63"/>
           <p:cNvCxnSpPr/>
           <p:nvPr/>
         </p:nvCxnSpPr>
         <p:spPr>
           <a:xfrm>
-            <a:off x="3886200" y="2078487"/>
+            <a:off x="3526289" y="2078487"/>
             <a:ext cx="0" cy="1218984"/>
           </a:xfrm>
           <a:prstGeom prst="line">
@@ -6333,7 +6333,7 @@
         </p:nvCxnSpPr>
         <p:spPr>
           <a:xfrm>
-            <a:off x="3894672" y="2209800"/>
+            <a:off x="3534761" y="2209800"/>
             <a:ext cx="769918" cy="0"/>
           </a:xfrm>
           <a:prstGeom prst="line">
@@ -6374,7 +6374,7 @@
         </p:nvCxnSpPr>
         <p:spPr>
           <a:xfrm>
-            <a:off x="3886200" y="2607244"/>
+            <a:off x="3526289" y="2607244"/>
             <a:ext cx="769918" cy="0"/>
           </a:xfrm>
           <a:prstGeom prst="line">
@@ -6415,7 +6415,7 @@
         </p:nvCxnSpPr>
         <p:spPr>
           <a:xfrm>
-            <a:off x="3886200" y="3048000"/>
+            <a:off x="3526289" y="3048000"/>
             <a:ext cx="769918" cy="0"/>
           </a:xfrm>
           <a:prstGeom prst="line">
@@ -6430,6 +6430,908 @@
             <a:prstDash val="sysDot"/>
             <a:headEnd type="none" w="med" len="med"/>
             <a:tailEnd type="none" w="med" len="med"/>
+          </a:ln>
+          <a:effectLst/>
+        </p:spPr>
+        <p:style>
+          <a:lnRef idx="1">
+            <a:schemeClr val="accent2"/>
+          </a:lnRef>
+          <a:fillRef idx="2">
+            <a:schemeClr val="accent2"/>
+          </a:fillRef>
+          <a:effectRef idx="1">
+            <a:schemeClr val="accent2"/>
+          </a:effectRef>
+          <a:fontRef idx="minor">
+            <a:schemeClr val="dk1"/>
+          </a:fontRef>
+        </p:style>
+      </p:cxnSp>
+      <p:sp>
+        <p:nvSpPr>
+          <p:cNvPr id="76" name="Rectangle 75"/>
+          <p:cNvSpPr/>
+          <p:nvPr/>
+        </p:nvSpPr>
+        <p:spPr>
+          <a:xfrm flipH="1">
+            <a:off x="4306821" y="3939188"/>
+            <a:ext cx="1093635" cy="346760"/>
+          </a:xfrm>
+          <a:prstGeom prst="rect">
+            <a:avLst/>
+          </a:prstGeom>
+          <a:solidFill>
+            <a:schemeClr val="accent5"/>
+          </a:solidFill>
+          <a:ln/>
+          <a:effectLst/>
+        </p:spPr>
+        <p:style>
+          <a:lnRef idx="1">
+            <a:schemeClr val="accent5"/>
+          </a:lnRef>
+          <a:fillRef idx="2">
+            <a:schemeClr val="accent5"/>
+          </a:fillRef>
+          <a:effectRef idx="1">
+            <a:schemeClr val="accent5"/>
+          </a:effectRef>
+          <a:fontRef idx="minor">
+            <a:schemeClr val="dk1"/>
+          </a:fontRef>
+        </p:style>
+        <p:txBody>
+          <a:bodyPr rtlCol="0" anchor="ctr"/>
+          <a:lstStyle/>
+          <a:p>
+            <a:pPr algn="ctr"/>
+            <a:r>
+              <a:rPr lang="en-US" sz="1050" b="1" dirty="0" err="1" smtClean="0">
+                <a:solidFill>
+                  <a:schemeClr val="bg1"/>
+                </a:solidFill>
+              </a:rPr>
+              <a:t>DateTimeParser</a:t>
+            </a:r>
+            <a:endParaRPr lang="en-SG" sz="1050" b="1" dirty="0">
+              <a:solidFill>
+                <a:schemeClr val="bg1"/>
+              </a:solidFill>
+            </a:endParaRPr>
+          </a:p>
+        </p:txBody>
+      </p:sp>
+      <p:cxnSp>
+        <p:nvCxnSpPr>
+          <p:cNvPr id="123" name="Elbow Connector 106"/>
+          <p:cNvCxnSpPr>
+            <a:endCxn id="76" idx="3"/>
+          </p:cNvCxnSpPr>
+          <p:nvPr/>
+        </p:nvCxnSpPr>
+        <p:spPr>
+          <a:xfrm flipV="1">
+            <a:off x="1742322" y="4112568"/>
+            <a:ext cx="2564499" cy="230832"/>
+          </a:xfrm>
+          <a:prstGeom prst="bentConnector3">
+            <a:avLst>
+              <a:gd name="adj1" fmla="val 12044"/>
+            </a:avLst>
+          </a:prstGeom>
+          <a:ln w="19050">
+            <a:solidFill>
+              <a:srgbClr val="0070C0"/>
+            </a:solidFill>
+            <a:prstDash val="solid"/>
+            <a:headEnd type="none" w="med" len="med"/>
+            <a:tailEnd type="arrow" w="med" len="med"/>
+          </a:ln>
+          <a:effectLst/>
+        </p:spPr>
+        <p:style>
+          <a:lnRef idx="1">
+            <a:schemeClr val="accent2"/>
+          </a:lnRef>
+          <a:fillRef idx="2">
+            <a:schemeClr val="accent2"/>
+          </a:fillRef>
+          <a:effectRef idx="1">
+            <a:schemeClr val="accent2"/>
+          </a:effectRef>
+          <a:fontRef idx="minor">
+            <a:schemeClr val="dk1"/>
+          </a:fontRef>
+        </p:style>
+      </p:cxnSp>
+      <p:sp>
+        <p:nvSpPr>
+          <p:cNvPr id="126" name="TextBox 125"/>
+          <p:cNvSpPr txBox="1"/>
+          <p:nvPr/>
+        </p:nvSpPr>
+        <p:spPr>
+          <a:xfrm>
+            <a:off x="2078489" y="4112568"/>
+            <a:ext cx="131116" cy="230832"/>
+          </a:xfrm>
+          <a:prstGeom prst="rect">
+            <a:avLst/>
+          </a:prstGeom>
+          <a:noFill/>
+        </p:spPr>
+        <p:txBody>
+          <a:bodyPr wrap="square" lIns="0" tIns="0" rIns="0" bIns="0" rtlCol="0">
+            <a:noAutofit/>
+          </a:bodyPr>
+          <a:lstStyle/>
+          <a:p>
+            <a:pPr algn="r"/>
+            <a:r>
+              <a:rPr lang="en-US" sz="1100" dirty="0">
+                <a:solidFill>
+                  <a:srgbClr val="0070C0"/>
+                </a:solidFill>
+              </a:rPr>
+              <a:t>1</a:t>
+            </a:r>
+            <a:endParaRPr lang="en-SG" sz="1100" dirty="0">
+              <a:solidFill>
+                <a:srgbClr val="0070C0"/>
+              </a:solidFill>
+            </a:endParaRPr>
+          </a:p>
+        </p:txBody>
+      </p:sp>
+      <p:sp>
+        <p:nvSpPr>
+          <p:cNvPr id="136" name="Rectangle 8"/>
+          <p:cNvSpPr/>
+          <p:nvPr/>
+        </p:nvSpPr>
+        <p:spPr>
+          <a:xfrm>
+            <a:off x="2298836" y="1340991"/>
+            <a:ext cx="1093635" cy="346760"/>
+          </a:xfrm>
+          <a:prstGeom prst="rect">
+            <a:avLst/>
+          </a:prstGeom>
+          <a:solidFill>
+            <a:srgbClr val="0070C0"/>
+          </a:solidFill>
+          <a:ln w="19050">
+            <a:solidFill>
+              <a:srgbClr val="0070C0"/>
+            </a:solidFill>
+          </a:ln>
+          <a:effectLst/>
+        </p:spPr>
+        <p:style>
+          <a:lnRef idx="1">
+            <a:schemeClr val="accent2"/>
+          </a:lnRef>
+          <a:fillRef idx="2">
+            <a:schemeClr val="accent2"/>
+          </a:fillRef>
+          <a:effectRef idx="1">
+            <a:schemeClr val="accent2"/>
+          </a:effectRef>
+          <a:fontRef idx="minor">
+            <a:schemeClr val="dk1"/>
+          </a:fontRef>
+        </p:style>
+        <p:txBody>
+          <a:bodyPr rtlCol="0" anchor="ctr"/>
+          <a:lstStyle/>
+          <a:p>
+            <a:pPr algn="ctr"/>
+            <a:r>
+              <a:rPr lang="en-US" sz="1050" dirty="0" err="1" smtClean="0">
+                <a:solidFill>
+                  <a:schemeClr val="bg1"/>
+                </a:solidFill>
+              </a:rPr>
+              <a:t>UndoManager</a:t>
+            </a:r>
+            <a:endParaRPr lang="en-US" sz="1050" dirty="0" smtClean="0">
+              <a:solidFill>
+                <a:schemeClr val="bg1"/>
+              </a:solidFill>
+            </a:endParaRPr>
+          </a:p>
+        </p:txBody>
+      </p:sp>
+      <p:cxnSp>
+        <p:nvCxnSpPr>
+          <p:cNvPr id="139" name="Elbow Connector 122"/>
+          <p:cNvCxnSpPr>
+            <a:endCxn id="136" idx="1"/>
+          </p:cNvCxnSpPr>
+          <p:nvPr/>
+        </p:nvCxnSpPr>
+        <p:spPr>
+          <a:xfrm rot="5400000" flipH="1" flipV="1">
+            <a:off x="711781" y="2684895"/>
+            <a:ext cx="2757578" cy="416531"/>
+          </a:xfrm>
+          <a:prstGeom prst="bentConnector2">
+            <a:avLst/>
+          </a:prstGeom>
+          <a:ln w="19050">
+            <a:solidFill>
+              <a:srgbClr val="0070C0"/>
+            </a:solidFill>
+            <a:prstDash val="sysDot"/>
+            <a:headEnd type="none" w="med" len="med"/>
+            <a:tailEnd type="arrow" w="med" len="med"/>
+          </a:ln>
+          <a:effectLst/>
+        </p:spPr>
+        <p:style>
+          <a:lnRef idx="1">
+            <a:schemeClr val="accent2"/>
+          </a:lnRef>
+          <a:fillRef idx="2">
+            <a:schemeClr val="accent2"/>
+          </a:fillRef>
+          <a:effectRef idx="1">
+            <a:schemeClr val="accent2"/>
+          </a:effectRef>
+          <a:fontRef idx="minor">
+            <a:schemeClr val="dk1"/>
+          </a:fontRef>
+        </p:style>
+      </p:cxnSp>
+      <p:sp>
+        <p:nvSpPr>
+          <p:cNvPr id="141" name="TextBox 140"/>
+          <p:cNvSpPr txBox="1"/>
+          <p:nvPr/>
+        </p:nvSpPr>
+        <p:spPr>
+          <a:xfrm>
+            <a:off x="1971015" y="1616273"/>
+            <a:ext cx="131116" cy="230832"/>
+          </a:xfrm>
+          <a:prstGeom prst="rect">
+            <a:avLst/>
+          </a:prstGeom>
+          <a:noFill/>
+        </p:spPr>
+        <p:txBody>
+          <a:bodyPr wrap="square" lIns="0" tIns="0" rIns="0" bIns="0" rtlCol="0">
+            <a:noAutofit/>
+          </a:bodyPr>
+          <a:lstStyle/>
+          <a:p>
+            <a:pPr algn="r"/>
+            <a:r>
+              <a:rPr lang="en-US" sz="1100" dirty="0">
+                <a:solidFill>
+                  <a:srgbClr val="0070C0"/>
+                </a:solidFill>
+              </a:rPr>
+              <a:t>1</a:t>
+            </a:r>
+            <a:endParaRPr lang="en-SG" sz="1100" dirty="0">
+              <a:solidFill>
+                <a:srgbClr val="0070C0"/>
+              </a:solidFill>
+            </a:endParaRPr>
+          </a:p>
+        </p:txBody>
+      </p:sp>
+      <p:cxnSp>
+        <p:nvCxnSpPr>
+          <p:cNvPr id="145" name="Elbow Connector 63"/>
+          <p:cNvCxnSpPr/>
+          <p:nvPr/>
+        </p:nvCxnSpPr>
+        <p:spPr>
+          <a:xfrm rot="10800000">
+            <a:off x="5398315" y="4112571"/>
+            <a:ext cx="1668313" cy="520185"/>
+          </a:xfrm>
+          <a:prstGeom prst="bentConnector3">
+            <a:avLst>
+              <a:gd name="adj1" fmla="val 50000"/>
+            </a:avLst>
+          </a:prstGeom>
+          <a:ln w="19050">
+            <a:solidFill>
+              <a:srgbClr val="0070C0"/>
+            </a:solidFill>
+            <a:prstDash val="sysDot"/>
+            <a:headEnd type="none" w="med" len="med"/>
+            <a:tailEnd type="arrow" w="med" len="med"/>
+          </a:ln>
+          <a:effectLst/>
+        </p:spPr>
+        <p:style>
+          <a:lnRef idx="1">
+            <a:schemeClr val="accent2"/>
+          </a:lnRef>
+          <a:fillRef idx="2">
+            <a:schemeClr val="accent2"/>
+          </a:fillRef>
+          <a:effectRef idx="1">
+            <a:schemeClr val="accent2"/>
+          </a:effectRef>
+          <a:fontRef idx="minor">
+            <a:schemeClr val="dk1"/>
+          </a:fontRef>
+        </p:style>
+      </p:cxnSp>
+      <p:sp>
+        <p:nvSpPr>
+          <p:cNvPr id="148" name="Isosceles Triangle 102"/>
+          <p:cNvSpPr/>
+          <p:nvPr/>
+        </p:nvSpPr>
+        <p:spPr>
+          <a:xfrm rot="16200000">
+            <a:off x="3363710" y="1419091"/>
+            <a:ext cx="270504" cy="175523"/>
+          </a:xfrm>
+          <a:prstGeom prst="triangle">
+            <a:avLst/>
+          </a:prstGeom>
+          <a:solidFill>
+            <a:schemeClr val="tx2">
+              <a:lumMod val="60000"/>
+              <a:lumOff val="40000"/>
+            </a:schemeClr>
+          </a:solidFill>
+          <a:ln w="19050">
+            <a:solidFill>
+              <a:srgbClr val="0070C0"/>
+            </a:solidFill>
+          </a:ln>
+          <a:effectLst/>
+        </p:spPr>
+        <p:style>
+          <a:lnRef idx="1">
+            <a:schemeClr val="accent1"/>
+          </a:lnRef>
+          <a:fillRef idx="2">
+            <a:schemeClr val="accent1"/>
+          </a:fillRef>
+          <a:effectRef idx="1">
+            <a:schemeClr val="accent1"/>
+          </a:effectRef>
+          <a:fontRef idx="minor">
+            <a:schemeClr val="dk1"/>
+          </a:fontRef>
+        </p:style>
+        <p:txBody>
+          <a:bodyPr rtlCol="0" anchor="ctr"/>
+          <a:lstStyle/>
+          <a:p>
+            <a:pPr algn="ctr"/>
+            <a:endParaRPr lang="en-SG" sz="1050" b="1">
+              <a:solidFill>
+                <a:srgbClr val="92D050"/>
+              </a:solidFill>
+            </a:endParaRPr>
+          </a:p>
+        </p:txBody>
+      </p:sp>
+      <p:cxnSp>
+        <p:nvCxnSpPr>
+          <p:cNvPr id="149" name="Elbow Connector 63"/>
+          <p:cNvCxnSpPr/>
+          <p:nvPr/>
+        </p:nvCxnSpPr>
+        <p:spPr>
+          <a:xfrm rot="5400000">
+            <a:off x="4022291" y="1053703"/>
+            <a:ext cx="15455" cy="887283"/>
+          </a:xfrm>
+          <a:prstGeom prst="bentConnector2">
+            <a:avLst/>
+          </a:prstGeom>
+          <a:ln w="19050">
+            <a:solidFill>
+              <a:srgbClr val="0070C0"/>
+            </a:solidFill>
+            <a:prstDash val="sysDot"/>
+            <a:headEnd type="none" w="med" len="med"/>
+            <a:tailEnd type="none" w="med" len="med"/>
+          </a:ln>
+          <a:effectLst/>
+        </p:spPr>
+        <p:style>
+          <a:lnRef idx="1">
+            <a:schemeClr val="accent2"/>
+          </a:lnRef>
+          <a:fillRef idx="2">
+            <a:schemeClr val="accent2"/>
+          </a:fillRef>
+          <a:effectRef idx="1">
+            <a:schemeClr val="accent2"/>
+          </a:effectRef>
+          <a:fontRef idx="minor">
+            <a:schemeClr val="dk1"/>
+          </a:fontRef>
+        </p:style>
+      </p:cxnSp>
+      <p:sp>
+        <p:nvSpPr>
+          <p:cNvPr id="151" name="Rectangle 8"/>
+          <p:cNvSpPr/>
+          <p:nvPr/>
+        </p:nvSpPr>
+        <p:spPr>
+          <a:xfrm>
+            <a:off x="3886200" y="1265676"/>
+            <a:ext cx="1504253" cy="346760"/>
+          </a:xfrm>
+          <a:prstGeom prst="rect">
+            <a:avLst/>
+          </a:prstGeom>
+          <a:solidFill>
+            <a:srgbClr val="0070C0"/>
+          </a:solidFill>
+          <a:ln w="19050">
+            <a:solidFill>
+              <a:srgbClr val="0070C0"/>
+            </a:solidFill>
+          </a:ln>
+          <a:effectLst/>
+        </p:spPr>
+        <p:style>
+          <a:lnRef idx="1">
+            <a:schemeClr val="accent2"/>
+          </a:lnRef>
+          <a:fillRef idx="2">
+            <a:schemeClr val="accent2"/>
+          </a:fillRef>
+          <a:effectRef idx="1">
+            <a:schemeClr val="accent2"/>
+          </a:effectRef>
+          <a:fontRef idx="minor">
+            <a:schemeClr val="dk1"/>
+          </a:fontRef>
+        </p:style>
+        <p:txBody>
+          <a:bodyPr rtlCol="0" anchor="ctr"/>
+          <a:lstStyle/>
+          <a:p>
+            <a:pPr algn="ctr"/>
+            <a:r>
+              <a:rPr lang="en-US" sz="1050" dirty="0" smtClean="0">
+                <a:solidFill>
+                  <a:schemeClr val="bg1"/>
+                </a:solidFill>
+              </a:rPr>
+              <a:t>&lt;&lt;interface&gt;&gt;</a:t>
+            </a:r>
+            <a:br>
+              <a:rPr lang="en-US" sz="1050" dirty="0" smtClean="0">
+                <a:solidFill>
+                  <a:schemeClr val="bg1"/>
+                </a:solidFill>
+              </a:rPr>
+            </a:br>
+            <a:r>
+              <a:rPr lang="en-US" sz="1050" dirty="0" smtClean="0">
+                <a:solidFill>
+                  <a:schemeClr val="bg1"/>
+                </a:solidFill>
+              </a:rPr>
+              <a:t>Changeable</a:t>
+            </a:r>
+          </a:p>
+        </p:txBody>
+      </p:sp>
+      <p:sp>
+        <p:nvSpPr>
+          <p:cNvPr id="152" name="Rectangle 65"/>
+          <p:cNvSpPr/>
+          <p:nvPr/>
+        </p:nvSpPr>
+        <p:spPr>
+          <a:xfrm rot="16200000">
+            <a:off x="6363907" y="2758054"/>
+            <a:ext cx="4472556" cy="328045"/>
+          </a:xfrm>
+          <a:prstGeom prst="roundRect">
+            <a:avLst/>
+          </a:prstGeom>
+          <a:solidFill>
+            <a:schemeClr val="accent4">
+              <a:lumMod val="20000"/>
+              <a:lumOff val="80000"/>
+            </a:schemeClr>
+          </a:solidFill>
+          <a:ln w="19050">
+            <a:noFill/>
+          </a:ln>
+          <a:effectLst/>
+        </p:spPr>
+        <p:style>
+          <a:lnRef idx="1">
+            <a:schemeClr val="accent2"/>
+          </a:lnRef>
+          <a:fillRef idx="2">
+            <a:schemeClr val="accent2"/>
+          </a:fillRef>
+          <a:effectRef idx="1">
+            <a:schemeClr val="accent2"/>
+          </a:effectRef>
+          <a:fontRef idx="minor">
+            <a:schemeClr val="dk1"/>
+          </a:fontRef>
+        </p:style>
+        <p:txBody>
+          <a:bodyPr rtlCol="0" anchor="ctr"/>
+          <a:lstStyle/>
+          <a:p>
+            <a:pPr algn="ctr"/>
+            <a:r>
+              <a:rPr lang="en-US" sz="1100" b="1" dirty="0" smtClean="0">
+                <a:solidFill>
+                  <a:schemeClr val="bg1"/>
+                </a:solidFill>
+              </a:rPr>
+              <a:t>UI</a:t>
+            </a:r>
+            <a:endParaRPr lang="en-SG" sz="1100" b="1" dirty="0">
+              <a:solidFill>
+                <a:schemeClr val="bg1"/>
+              </a:solidFill>
+            </a:endParaRPr>
+          </a:p>
+        </p:txBody>
+      </p:sp>
+      <p:sp>
+        <p:nvSpPr>
+          <p:cNvPr id="153" name="Rectangle 8"/>
+          <p:cNvSpPr/>
+          <p:nvPr/>
+        </p:nvSpPr>
+        <p:spPr>
+          <a:xfrm>
+            <a:off x="6007916" y="1197943"/>
+            <a:ext cx="1472140" cy="346760"/>
+          </a:xfrm>
+          <a:prstGeom prst="rect">
+            <a:avLst/>
+          </a:prstGeom>
+          <a:solidFill>
+            <a:srgbClr val="0070C0"/>
+          </a:solidFill>
+          <a:ln w="19050">
+            <a:solidFill>
+              <a:srgbClr val="0070C0"/>
+            </a:solidFill>
+          </a:ln>
+          <a:effectLst/>
+        </p:spPr>
+        <p:style>
+          <a:lnRef idx="1">
+            <a:schemeClr val="accent2"/>
+          </a:lnRef>
+          <a:fillRef idx="2">
+            <a:schemeClr val="accent2"/>
+          </a:fillRef>
+          <a:effectRef idx="1">
+            <a:schemeClr val="accent2"/>
+          </a:effectRef>
+          <a:fontRef idx="minor">
+            <a:schemeClr val="dk1"/>
+          </a:fontRef>
+        </p:style>
+        <p:txBody>
+          <a:bodyPr rtlCol="0" anchor="ctr"/>
+          <a:lstStyle/>
+          <a:p>
+            <a:pPr algn="ctr"/>
+            <a:r>
+              <a:rPr lang="en-US" sz="1050" smtClean="0">
+                <a:solidFill>
+                  <a:schemeClr val="bg1"/>
+                </a:solidFill>
+              </a:rPr>
+              <a:t>AutocompleteManager</a:t>
+            </a:r>
+            <a:endParaRPr lang="en-SG" sz="1050" dirty="0">
+              <a:solidFill>
+                <a:schemeClr val="bg1"/>
+              </a:solidFill>
+            </a:endParaRPr>
+          </a:p>
+        </p:txBody>
+      </p:sp>
+      <p:sp>
+        <p:nvSpPr>
+          <p:cNvPr id="154" name="Rectangle 8"/>
+          <p:cNvSpPr/>
+          <p:nvPr/>
+        </p:nvSpPr>
+        <p:spPr>
+          <a:xfrm>
+            <a:off x="3892091" y="1704777"/>
+            <a:ext cx="1498362" cy="346760"/>
+          </a:xfrm>
+          <a:prstGeom prst="rect">
+            <a:avLst/>
+          </a:prstGeom>
+          <a:solidFill>
+            <a:srgbClr val="0070C0"/>
+          </a:solidFill>
+          <a:ln w="19050">
+            <a:solidFill>
+              <a:srgbClr val="0070C0"/>
+            </a:solidFill>
+          </a:ln>
+          <a:effectLst/>
+        </p:spPr>
+        <p:style>
+          <a:lnRef idx="1">
+            <a:schemeClr val="accent2"/>
+          </a:lnRef>
+          <a:fillRef idx="2">
+            <a:schemeClr val="accent2"/>
+          </a:fillRef>
+          <a:effectRef idx="1">
+            <a:schemeClr val="accent2"/>
+          </a:effectRef>
+          <a:fontRef idx="minor">
+            <a:schemeClr val="dk1"/>
+          </a:fontRef>
+        </p:style>
+        <p:txBody>
+          <a:bodyPr rtlCol="0" anchor="ctr"/>
+          <a:lstStyle/>
+          <a:p>
+            <a:pPr algn="ctr"/>
+            <a:r>
+              <a:rPr lang="en-US" sz="1050" dirty="0" smtClean="0">
+                <a:solidFill>
+                  <a:schemeClr val="bg1"/>
+                </a:solidFill>
+              </a:rPr>
+              <a:t>&lt;&lt;interface&gt;&gt;</a:t>
+            </a:r>
+            <a:br>
+              <a:rPr lang="en-US" sz="1050" dirty="0" smtClean="0">
+                <a:solidFill>
+                  <a:schemeClr val="bg1"/>
+                </a:solidFill>
+              </a:rPr>
+            </a:br>
+            <a:r>
+              <a:rPr lang="en-US" sz="1050" dirty="0" err="1" smtClean="0">
+                <a:solidFill>
+                  <a:schemeClr val="bg1"/>
+                </a:solidFill>
+              </a:rPr>
+              <a:t>CommandHistory</a:t>
+            </a:r>
+            <a:endParaRPr lang="en-SG" sz="1050" dirty="0">
+              <a:solidFill>
+                <a:schemeClr val="bg1"/>
+              </a:solidFill>
+            </a:endParaRPr>
+          </a:p>
+        </p:txBody>
+      </p:sp>
+      <p:sp>
+        <p:nvSpPr>
+          <p:cNvPr id="157" name="Rectangle 8"/>
+          <p:cNvSpPr/>
+          <p:nvPr/>
+        </p:nvSpPr>
+        <p:spPr>
+          <a:xfrm>
+            <a:off x="6007916" y="1667469"/>
+            <a:ext cx="1688284" cy="346760"/>
+          </a:xfrm>
+          <a:prstGeom prst="rect">
+            <a:avLst/>
+          </a:prstGeom>
+          <a:solidFill>
+            <a:srgbClr val="0070C0"/>
+          </a:solidFill>
+          <a:ln w="19050">
+            <a:solidFill>
+              <a:srgbClr val="0070C0"/>
+            </a:solidFill>
+          </a:ln>
+          <a:effectLst/>
+        </p:spPr>
+        <p:style>
+          <a:lnRef idx="1">
+            <a:schemeClr val="accent2"/>
+          </a:lnRef>
+          <a:fillRef idx="2">
+            <a:schemeClr val="accent2"/>
+          </a:fillRef>
+          <a:effectRef idx="1">
+            <a:schemeClr val="accent2"/>
+          </a:effectRef>
+          <a:fontRef idx="minor">
+            <a:schemeClr val="dk1"/>
+          </a:fontRef>
+        </p:style>
+        <p:txBody>
+          <a:bodyPr rtlCol="0" anchor="ctr"/>
+          <a:lstStyle/>
+          <a:p>
+            <a:pPr algn="ctr"/>
+            <a:r>
+              <a:rPr lang="en-US" sz="1050" smtClean="0">
+                <a:solidFill>
+                  <a:schemeClr val="bg1"/>
+                </a:solidFill>
+              </a:rPr>
+              <a:t>CommandHistoryManager</a:t>
+            </a:r>
+            <a:endParaRPr lang="en-SG" sz="1050" dirty="0">
+              <a:solidFill>
+                <a:schemeClr val="bg1"/>
+              </a:solidFill>
+            </a:endParaRPr>
+          </a:p>
+        </p:txBody>
+      </p:sp>
+      <p:cxnSp>
+        <p:nvCxnSpPr>
+          <p:cNvPr id="158" name="Elbow Connector 63"/>
+          <p:cNvCxnSpPr/>
+          <p:nvPr/>
+        </p:nvCxnSpPr>
+        <p:spPr>
+          <a:xfrm rot="5400000">
+            <a:off x="5390586" y="1413640"/>
+            <a:ext cx="15455" cy="887283"/>
+          </a:xfrm>
+          <a:prstGeom prst="bentConnector2">
+            <a:avLst/>
+          </a:prstGeom>
+          <a:ln w="19050">
+            <a:solidFill>
+              <a:srgbClr val="0070C0"/>
+            </a:solidFill>
+            <a:prstDash val="sysDot"/>
+            <a:headEnd type="none" w="med" len="med"/>
+            <a:tailEnd type="none" w="med" len="med"/>
+          </a:ln>
+          <a:effectLst/>
+        </p:spPr>
+        <p:style>
+          <a:lnRef idx="1">
+            <a:schemeClr val="accent2"/>
+          </a:lnRef>
+          <a:fillRef idx="2">
+            <a:schemeClr val="accent2"/>
+          </a:fillRef>
+          <a:effectRef idx="1">
+            <a:schemeClr val="accent2"/>
+          </a:effectRef>
+          <a:fontRef idx="minor">
+            <a:schemeClr val="dk1"/>
+          </a:fontRef>
+        </p:style>
+      </p:cxnSp>
+      <p:sp>
+        <p:nvSpPr>
+          <p:cNvPr id="159" name="Isosceles Triangle 102"/>
+          <p:cNvSpPr/>
+          <p:nvPr/>
+        </p:nvSpPr>
+        <p:spPr>
+          <a:xfrm rot="5400000">
+            <a:off x="5766831" y="1779448"/>
+            <a:ext cx="270504" cy="175523"/>
+          </a:xfrm>
+          <a:prstGeom prst="triangle">
+            <a:avLst/>
+          </a:prstGeom>
+          <a:solidFill>
+            <a:schemeClr val="tx2">
+              <a:lumMod val="60000"/>
+              <a:lumOff val="40000"/>
+            </a:schemeClr>
+          </a:solidFill>
+          <a:ln w="19050">
+            <a:solidFill>
+              <a:srgbClr val="0070C0"/>
+            </a:solidFill>
+          </a:ln>
+          <a:effectLst/>
+        </p:spPr>
+        <p:style>
+          <a:lnRef idx="1">
+            <a:schemeClr val="accent1"/>
+          </a:lnRef>
+          <a:fillRef idx="2">
+            <a:schemeClr val="accent1"/>
+          </a:fillRef>
+          <a:effectRef idx="1">
+            <a:schemeClr val="accent1"/>
+          </a:effectRef>
+          <a:fontRef idx="minor">
+            <a:schemeClr val="dk1"/>
+          </a:fontRef>
+        </p:style>
+        <p:txBody>
+          <a:bodyPr rtlCol="0" anchor="ctr"/>
+          <a:lstStyle/>
+          <a:p>
+            <a:pPr algn="ctr"/>
+            <a:endParaRPr lang="en-SG" sz="1050" b="1">
+              <a:solidFill>
+                <a:srgbClr val="92D050"/>
+              </a:solidFill>
+            </a:endParaRPr>
+          </a:p>
+        </p:txBody>
+      </p:sp>
+      <p:cxnSp>
+        <p:nvCxnSpPr>
+          <p:cNvPr id="160" name="Straight Arrow Connector 57"/>
+          <p:cNvCxnSpPr/>
+          <p:nvPr/>
+        </p:nvCxnSpPr>
+        <p:spPr>
+          <a:xfrm>
+            <a:off x="7696200" y="1828800"/>
+            <a:ext cx="735539" cy="0"/>
+          </a:xfrm>
+          <a:prstGeom prst="straightConnector1">
+            <a:avLst/>
+          </a:prstGeom>
+          <a:ln w="19050">
+            <a:solidFill>
+              <a:srgbClr val="0070C0"/>
+            </a:solidFill>
+            <a:headEnd type="none" w="med" len="med"/>
+            <a:tailEnd type="arrow" w="med" len="med"/>
+          </a:ln>
+          <a:effectLst/>
+        </p:spPr>
+        <p:style>
+          <a:lnRef idx="1">
+            <a:schemeClr val="accent2"/>
+          </a:lnRef>
+          <a:fillRef idx="2">
+            <a:schemeClr val="accent2"/>
+          </a:fillRef>
+          <a:effectRef idx="1">
+            <a:schemeClr val="accent2"/>
+          </a:effectRef>
+          <a:fontRef idx="minor">
+            <a:schemeClr val="dk1"/>
+          </a:fontRef>
+        </p:style>
+      </p:cxnSp>
+      <p:cxnSp>
+        <p:nvCxnSpPr>
+          <p:cNvPr id="167" name="Straight Arrow Connector 57"/>
+          <p:cNvCxnSpPr>
+            <a:stCxn id="153" idx="3"/>
+          </p:cNvCxnSpPr>
+          <p:nvPr/>
+        </p:nvCxnSpPr>
+        <p:spPr>
+          <a:xfrm flipV="1">
+            <a:off x="7480056" y="1368608"/>
+            <a:ext cx="951683" cy="2715"/>
+          </a:xfrm>
+          <a:prstGeom prst="straightConnector1">
+            <a:avLst/>
+          </a:prstGeom>
+          <a:ln w="19050">
+            <a:solidFill>
+              <a:srgbClr val="0070C0"/>
+            </a:solidFill>
+            <a:headEnd type="none" w="med" len="med"/>
+            <a:tailEnd type="arrow" w="med" len="med"/>
           </a:ln>
           <a:effectLst/>
         </p:spPr>
@@ -6458,6 +7360,13 @@
   <p:clrMapOvr>
     <a:masterClrMapping/>
   </p:clrMapOvr>
+  <p:timing>
+    <p:tnLst>
+      <p:par>
+        <p:cTn id="1" dur="indefinite" restart="never" nodeType="tmRoot"/>
+      </p:par>
+    </p:tnLst>
+  </p:timing>
 </p:sld>
 </file>
 

</xml_diff>

<commit_message>
Update logic component class diagram and ppt
</commit_message>
<xml_diff>
--- a/docs/diagrams/LogicComponentClassDiagram.pptx
+++ b/docs/diagrams/LogicComponentClassDiagram.pptx
@@ -208,7 +208,7 @@
           <a:p>
             <a:fld id="{F5CC4B3F-88C1-4FFA-B1B6-F41C21DC6924}" type="datetimeFigureOut">
               <a:rPr lang="en-US" smtClean="0"/>
-              <a:t>3/24/17</a:t>
+              <a:t>3/26/17</a:t>
             </a:fld>
             <a:endParaRPr lang="en-US"/>
           </a:p>
@@ -657,7 +657,7 @@
           <a:p>
             <a:fld id="{78C97017-6FC3-485B-9764-EAC9E56C1D49}" type="datetimeFigureOut">
               <a:rPr lang="en-US" smtClean="0"/>
-              <a:t>3/24/17</a:t>
+              <a:t>3/26/17</a:t>
             </a:fld>
             <a:endParaRPr lang="en-US"/>
           </a:p>
@@ -827,7 +827,7 @@
           <a:p>
             <a:fld id="{78C97017-6FC3-485B-9764-EAC9E56C1D49}" type="datetimeFigureOut">
               <a:rPr lang="en-US" smtClean="0"/>
-              <a:t>3/24/17</a:t>
+              <a:t>3/26/17</a:t>
             </a:fld>
             <a:endParaRPr lang="en-US"/>
           </a:p>
@@ -1007,7 +1007,7 @@
           <a:p>
             <a:fld id="{78C97017-6FC3-485B-9764-EAC9E56C1D49}" type="datetimeFigureOut">
               <a:rPr lang="en-US" smtClean="0"/>
-              <a:t>3/24/17</a:t>
+              <a:t>3/26/17</a:t>
             </a:fld>
             <a:endParaRPr lang="en-US"/>
           </a:p>
@@ -1177,7 +1177,7 @@
           <a:p>
             <a:fld id="{78C97017-6FC3-485B-9764-EAC9E56C1D49}" type="datetimeFigureOut">
               <a:rPr lang="en-US" smtClean="0"/>
-              <a:t>3/24/17</a:t>
+              <a:t>3/26/17</a:t>
             </a:fld>
             <a:endParaRPr lang="en-US"/>
           </a:p>
@@ -1423,7 +1423,7 @@
           <a:p>
             <a:fld id="{78C97017-6FC3-485B-9764-EAC9E56C1D49}" type="datetimeFigureOut">
               <a:rPr lang="en-US" smtClean="0"/>
-              <a:t>3/24/17</a:t>
+              <a:t>3/26/17</a:t>
             </a:fld>
             <a:endParaRPr lang="en-US"/>
           </a:p>
@@ -1711,7 +1711,7 @@
           <a:p>
             <a:fld id="{78C97017-6FC3-485B-9764-EAC9E56C1D49}" type="datetimeFigureOut">
               <a:rPr lang="en-US" smtClean="0"/>
-              <a:t>3/24/17</a:t>
+              <a:t>3/26/17</a:t>
             </a:fld>
             <a:endParaRPr lang="en-US"/>
           </a:p>
@@ -2133,7 +2133,7 @@
           <a:p>
             <a:fld id="{78C97017-6FC3-485B-9764-EAC9E56C1D49}" type="datetimeFigureOut">
               <a:rPr lang="en-US" smtClean="0"/>
-              <a:t>3/24/17</a:t>
+              <a:t>3/26/17</a:t>
             </a:fld>
             <a:endParaRPr lang="en-US"/>
           </a:p>
@@ -2251,7 +2251,7 @@
           <a:p>
             <a:fld id="{78C97017-6FC3-485B-9764-EAC9E56C1D49}" type="datetimeFigureOut">
               <a:rPr lang="en-US" smtClean="0"/>
-              <a:t>3/24/17</a:t>
+              <a:t>3/26/17</a:t>
             </a:fld>
             <a:endParaRPr lang="en-US"/>
           </a:p>
@@ -2346,7 +2346,7 @@
           <a:p>
             <a:fld id="{78C97017-6FC3-485B-9764-EAC9E56C1D49}" type="datetimeFigureOut">
               <a:rPr lang="en-US" smtClean="0"/>
-              <a:t>3/24/17</a:t>
+              <a:t>3/26/17</a:t>
             </a:fld>
             <a:endParaRPr lang="en-US"/>
           </a:p>
@@ -2623,7 +2623,7 @@
           <a:p>
             <a:fld id="{78C97017-6FC3-485B-9764-EAC9E56C1D49}" type="datetimeFigureOut">
               <a:rPr lang="en-US" smtClean="0"/>
-              <a:t>3/24/17</a:t>
+              <a:t>3/26/17</a:t>
             </a:fld>
             <a:endParaRPr lang="en-US"/>
           </a:p>
@@ -2876,7 +2876,7 @@
           <a:p>
             <a:fld id="{78C97017-6FC3-485B-9764-EAC9E56C1D49}" type="datetimeFigureOut">
               <a:rPr lang="en-US" smtClean="0"/>
-              <a:t>3/24/17</a:t>
+              <a:t>3/26/17</a:t>
             </a:fld>
             <a:endParaRPr lang="en-US"/>
           </a:p>
@@ -3089,7 +3089,7 @@
           <a:p>
             <a:fld id="{78C97017-6FC3-485B-9764-EAC9E56C1D49}" type="datetimeFigureOut">
               <a:rPr lang="en-US" smtClean="0"/>
-              <a:t>3/24/17</a:t>
+              <a:t>3/26/17</a:t>
             </a:fld>
             <a:endParaRPr lang="en-US"/>
           </a:p>
@@ -6922,8 +6922,13 @@
                   <a:schemeClr val="bg1"/>
                 </a:solidFill>
               </a:rPr>
-              <a:t>Changeable</a:t>
-            </a:r>
+              <a:t>Undo</a:t>
+            </a:r>
+            <a:endParaRPr lang="en-US" sz="1050" dirty="0" smtClean="0">
+              <a:solidFill>
+                <a:schemeClr val="bg1"/>
+              </a:solidFill>
+            </a:endParaRPr>
           </a:p>
         </p:txBody>
       </p:sp>

</xml_diff>